<commit_message>
02. Hello World! add
</commit_message>
<xml_diff>
--- a/01. Python&PEP8/01. Python & PEP8.pptx
+++ b/01. Python&PEP8/01. Python & PEP8.pptx
@@ -5,7 +5,7 @@
     <p:sldMasterId id="2147483648" r:id="rId1"/>
   </p:sldMasterIdLst>
   <p:notesMasterIdLst>
-    <p:notesMasterId r:id="rId32"/>
+    <p:notesMasterId r:id="rId33"/>
   </p:notesMasterIdLst>
   <p:sldIdLst>
     <p:sldId id="256" r:id="rId2"/>
@@ -36,8 +36,9 @@
     <p:sldId id="281" r:id="rId27"/>
     <p:sldId id="282" r:id="rId28"/>
     <p:sldId id="283" r:id="rId29"/>
-    <p:sldId id="285" r:id="rId30"/>
-    <p:sldId id="284" r:id="rId31"/>
+    <p:sldId id="286" r:id="rId30"/>
+    <p:sldId id="285" r:id="rId31"/>
+    <p:sldId id="284" r:id="rId32"/>
   </p:sldIdLst>
   <p:sldSz cx="12192000" cy="6858000"/>
   <p:notesSz cx="6858000" cy="9144000"/>
@@ -226,7 +227,7 @@
           <a:p>
             <a:fld id="{05C48174-E545-442B-973B-CFD060E5DF1E}" type="datetimeFigureOut">
               <a:rPr lang="en-US" smtClean="0"/>
-              <a:t>8/31/2018</a:t>
+              <a:t>9/12/2018</a:t>
             </a:fld>
             <a:endParaRPr lang="en-US"/>
           </a:p>
@@ -2167,7 +2168,7 @@
           <a:p>
             <a:fld id="{795FA750-E810-4AD3-9221-27790D7881D7}" type="datetimeFigureOut">
               <a:rPr lang="en-US" smtClean="0"/>
-              <a:t>8/31/2018</a:t>
+              <a:t>9/12/2018</a:t>
             </a:fld>
             <a:endParaRPr lang="en-US"/>
           </a:p>
@@ -2480,7 +2481,7 @@
           <a:p>
             <a:fld id="{795FA750-E810-4AD3-9221-27790D7881D7}" type="datetimeFigureOut">
               <a:rPr lang="en-US" smtClean="0"/>
-              <a:t>8/31/2018</a:t>
+              <a:t>9/12/2018</a:t>
             </a:fld>
             <a:endParaRPr lang="en-US"/>
           </a:p>
@@ -2769,7 +2770,7 @@
           <a:p>
             <a:fld id="{795FA750-E810-4AD3-9221-27790D7881D7}" type="datetimeFigureOut">
               <a:rPr lang="en-US" smtClean="0"/>
-              <a:t>8/31/2018</a:t>
+              <a:t>9/12/2018</a:t>
             </a:fld>
             <a:endParaRPr lang="en-US"/>
           </a:p>
@@ -2969,7 +2970,7 @@
           <a:p>
             <a:fld id="{795FA750-E810-4AD3-9221-27790D7881D7}" type="datetimeFigureOut">
               <a:rPr lang="en-US" smtClean="0"/>
-              <a:t>8/31/2018</a:t>
+              <a:t>9/12/2018</a:t>
             </a:fld>
             <a:endParaRPr lang="en-US"/>
           </a:p>
@@ -3179,7 +3180,7 @@
           <a:p>
             <a:fld id="{795FA750-E810-4AD3-9221-27790D7881D7}" type="datetimeFigureOut">
               <a:rPr lang="en-US" smtClean="0"/>
-              <a:t>8/31/2018</a:t>
+              <a:t>9/12/2018</a:t>
             </a:fld>
             <a:endParaRPr lang="en-US"/>
           </a:p>
@@ -3400,7 +3401,7 @@
           <a:p>
             <a:fld id="{795FA750-E810-4AD3-9221-27790D7881D7}" type="datetimeFigureOut">
               <a:rPr lang="en-US" smtClean="0"/>
-              <a:t>8/31/2018</a:t>
+              <a:t>9/12/2018</a:t>
             </a:fld>
             <a:endParaRPr lang="en-US"/>
           </a:p>
@@ -3597,7 +3598,7 @@
           <a:p>
             <a:fld id="{795FA750-E810-4AD3-9221-27790D7881D7}" type="datetimeFigureOut">
               <a:rPr lang="en-US" smtClean="0"/>
-              <a:t>8/31/2018</a:t>
+              <a:t>9/12/2018</a:t>
             </a:fld>
             <a:endParaRPr lang="en-US"/>
           </a:p>
@@ -3873,7 +3874,7 @@
           <a:p>
             <a:fld id="{795FA750-E810-4AD3-9221-27790D7881D7}" type="datetimeFigureOut">
               <a:rPr lang="en-US" smtClean="0"/>
-              <a:t>8/31/2018</a:t>
+              <a:t>9/12/2018</a:t>
             </a:fld>
             <a:endParaRPr lang="en-US"/>
           </a:p>
@@ -4141,7 +4142,7 @@
           <a:p>
             <a:fld id="{795FA750-E810-4AD3-9221-27790D7881D7}" type="datetimeFigureOut">
               <a:rPr lang="en-US" smtClean="0"/>
-              <a:t>8/31/2018</a:t>
+              <a:t>9/12/2018</a:t>
             </a:fld>
             <a:endParaRPr lang="en-US"/>
           </a:p>
@@ -4556,7 +4557,7 @@
           <a:p>
             <a:fld id="{795FA750-E810-4AD3-9221-27790D7881D7}" type="datetimeFigureOut">
               <a:rPr lang="en-US" smtClean="0"/>
-              <a:t>8/31/2018</a:t>
+              <a:t>9/12/2018</a:t>
             </a:fld>
             <a:endParaRPr lang="en-US"/>
           </a:p>
@@ -4698,7 +4699,7 @@
           <a:p>
             <a:fld id="{795FA750-E810-4AD3-9221-27790D7881D7}" type="datetimeFigureOut">
               <a:rPr lang="en-US" smtClean="0"/>
-              <a:t>8/31/2018</a:t>
+              <a:t>9/12/2018</a:t>
             </a:fld>
             <a:endParaRPr lang="en-US"/>
           </a:p>
@@ -4811,7 +4812,7 @@
           <a:p>
             <a:fld id="{795FA750-E810-4AD3-9221-27790D7881D7}" type="datetimeFigureOut">
               <a:rPr lang="en-US" smtClean="0"/>
-              <a:t>8/31/2018</a:t>
+              <a:t>9/12/2018</a:t>
             </a:fld>
             <a:endParaRPr lang="en-US"/>
           </a:p>
@@ -4924,7 +4925,7 @@
           <a:p>
             <a:fld id="{795FA750-E810-4AD3-9221-27790D7881D7}" type="datetimeFigureOut">
               <a:rPr lang="en-US" smtClean="0"/>
-              <a:t>8/31/2018</a:t>
+              <a:t>9/12/2018</a:t>
             </a:fld>
             <a:endParaRPr lang="en-US"/>
           </a:p>
@@ -5211,7 +5212,7 @@
             <a:fld id="{795FA750-E810-4AD3-9221-27790D7881D7}" type="datetimeFigureOut">
               <a:rPr lang="en-US" smtClean="0"/>
               <a:pPr/>
-              <a:t>8/31/2018</a:t>
+              <a:t>9/12/2018</a:t>
             </a:fld>
             <a:endParaRPr lang="en-US"/>
           </a:p>
@@ -7438,6 +7439,134 @@
 <file path=ppt/slides/slide29.xml><?xml version="1.0" encoding="utf-8"?>
 <p:sld xmlns:a="http://schemas.openxmlformats.org/drawingml/2006/main" xmlns:r="http://schemas.openxmlformats.org/officeDocument/2006/relationships" xmlns:p="http://schemas.openxmlformats.org/presentationml/2006/main">
   <p:cSld>
+    <p:spTree>
+      <p:nvGrpSpPr>
+        <p:cNvPr id="1" name=""/>
+        <p:cNvGrpSpPr/>
+        <p:nvPr/>
+      </p:nvGrpSpPr>
+      <p:grpSpPr>
+        <a:xfrm>
+          <a:off x="0" y="0"/>
+          <a:ext cx="0" cy="0"/>
+          <a:chOff x="0" y="0"/>
+          <a:chExt cx="0" cy="0"/>
+        </a:xfrm>
+      </p:grpSpPr>
+      <p:sp>
+        <p:nvSpPr>
+          <p:cNvPr id="2" name="제목 1">
+            <a:extLst>
+              <a:ext uri="{FF2B5EF4-FFF2-40B4-BE49-F238E27FC236}">
+                <a16:creationId xmlns:a16="http://schemas.microsoft.com/office/drawing/2014/main" id="{EA12678B-C758-4695-B948-1166C61AE412}"/>
+              </a:ext>
+            </a:extLst>
+          </p:cNvPr>
+          <p:cNvSpPr>
+            <a:spLocks noGrp="1"/>
+          </p:cNvSpPr>
+          <p:nvPr>
+            <p:ph type="title"/>
+          </p:nvPr>
+        </p:nvSpPr>
+        <p:spPr/>
+        <p:txBody>
+          <a:bodyPr/>
+          <a:lstStyle/>
+          <a:p>
+            <a:r>
+              <a:rPr lang="en-US" i="1" dirty="0"/>
+              <a:t>Code Editor</a:t>
+            </a:r>
+          </a:p>
+        </p:txBody>
+      </p:sp>
+    </p:spTree>
+    <p:extLst>
+      <p:ext uri="{BB962C8B-B14F-4D97-AF65-F5344CB8AC3E}">
+        <p14:creationId xmlns:p14="http://schemas.microsoft.com/office/powerpoint/2010/main" val="4278697423"/>
+      </p:ext>
+    </p:extLst>
+  </p:cSld>
+  <p:clrMapOvr>
+    <a:masterClrMapping/>
+  </p:clrMapOvr>
+</p:sld>
+</file>
+
+<file path=ppt/slides/slide3.xml><?xml version="1.0" encoding="utf-8"?>
+<p:sld xmlns:a="http://schemas.openxmlformats.org/drawingml/2006/main" xmlns:r="http://schemas.openxmlformats.org/officeDocument/2006/relationships" xmlns:p="http://schemas.openxmlformats.org/presentationml/2006/main">
+  <p:cSld>
+    <p:spTree>
+      <p:nvGrpSpPr>
+        <p:cNvPr id="1" name=""/>
+        <p:cNvGrpSpPr/>
+        <p:nvPr/>
+      </p:nvGrpSpPr>
+      <p:grpSpPr>
+        <a:xfrm>
+          <a:off x="0" y="0"/>
+          <a:ext cx="0" cy="0"/>
+          <a:chOff x="0" y="0"/>
+          <a:chExt cx="0" cy="0"/>
+        </a:xfrm>
+      </p:grpSpPr>
+      <p:sp>
+        <p:nvSpPr>
+          <p:cNvPr id="3" name="제목 2">
+            <a:extLst>
+              <a:ext uri="{FF2B5EF4-FFF2-40B4-BE49-F238E27FC236}">
+                <a16:creationId xmlns:a16="http://schemas.microsoft.com/office/drawing/2014/main" id="{017242F4-A9D7-41C5-A59B-CFD9F933ABD7}"/>
+              </a:ext>
+            </a:extLst>
+          </p:cNvPr>
+          <p:cNvSpPr>
+            <a:spLocks noGrp="1"/>
+          </p:cNvSpPr>
+          <p:nvPr>
+            <p:ph type="title"/>
+          </p:nvPr>
+        </p:nvSpPr>
+        <p:spPr/>
+        <p:txBody>
+          <a:bodyPr>
+            <a:normAutofit/>
+          </a:bodyPr>
+          <a:lstStyle/>
+          <a:p>
+            <a:r>
+              <a:rPr lang="en-US" i="1" dirty="0"/>
+              <a:t>Life is short, You need </a:t>
+            </a:r>
+            <a:r>
+              <a:rPr lang="en-US" i="1" dirty="0">
+                <a:solidFill>
+                  <a:schemeClr val="accent1">
+                    <a:lumMod val="75000"/>
+                  </a:schemeClr>
+                </a:solidFill>
+              </a:rPr>
+              <a:t>Python.</a:t>
+            </a:r>
+          </a:p>
+        </p:txBody>
+      </p:sp>
+    </p:spTree>
+    <p:extLst>
+      <p:ext uri="{BB962C8B-B14F-4D97-AF65-F5344CB8AC3E}">
+        <p14:creationId xmlns:p14="http://schemas.microsoft.com/office/powerpoint/2010/main" val="1812056725"/>
+      </p:ext>
+    </p:extLst>
+  </p:cSld>
+  <p:clrMapOvr>
+    <a:masterClrMapping/>
+  </p:clrMapOvr>
+</p:sld>
+</file>
+
+<file path=ppt/slides/slide30.xml><?xml version="1.0" encoding="utf-8"?>
+<p:sld xmlns:a="http://schemas.openxmlformats.org/drawingml/2006/main" xmlns:r="http://schemas.openxmlformats.org/officeDocument/2006/relationships" xmlns:p="http://schemas.openxmlformats.org/presentationml/2006/main">
+  <p:cSld>
     <p:bg>
       <p:bgPr>
         <a:solidFill>
@@ -7522,77 +7651,7 @@
 </p:sld>
 </file>
 
-<file path=ppt/slides/slide3.xml><?xml version="1.0" encoding="utf-8"?>
-<p:sld xmlns:a="http://schemas.openxmlformats.org/drawingml/2006/main" xmlns:r="http://schemas.openxmlformats.org/officeDocument/2006/relationships" xmlns:p="http://schemas.openxmlformats.org/presentationml/2006/main">
-  <p:cSld>
-    <p:spTree>
-      <p:nvGrpSpPr>
-        <p:cNvPr id="1" name=""/>
-        <p:cNvGrpSpPr/>
-        <p:nvPr/>
-      </p:nvGrpSpPr>
-      <p:grpSpPr>
-        <a:xfrm>
-          <a:off x="0" y="0"/>
-          <a:ext cx="0" cy="0"/>
-          <a:chOff x="0" y="0"/>
-          <a:chExt cx="0" cy="0"/>
-        </a:xfrm>
-      </p:grpSpPr>
-      <p:sp>
-        <p:nvSpPr>
-          <p:cNvPr id="3" name="제목 2">
-            <a:extLst>
-              <a:ext uri="{FF2B5EF4-FFF2-40B4-BE49-F238E27FC236}">
-                <a16:creationId xmlns:a16="http://schemas.microsoft.com/office/drawing/2014/main" id="{017242F4-A9D7-41C5-A59B-CFD9F933ABD7}"/>
-              </a:ext>
-            </a:extLst>
-          </p:cNvPr>
-          <p:cNvSpPr>
-            <a:spLocks noGrp="1"/>
-          </p:cNvSpPr>
-          <p:nvPr>
-            <p:ph type="title"/>
-          </p:nvPr>
-        </p:nvSpPr>
-        <p:spPr/>
-        <p:txBody>
-          <a:bodyPr>
-            <a:normAutofit/>
-          </a:bodyPr>
-          <a:lstStyle/>
-          <a:p>
-            <a:r>
-              <a:rPr lang="en-US" i="1" dirty="0"/>
-              <a:t>Life is short, You need </a:t>
-            </a:r>
-            <a:r>
-              <a:rPr lang="en-US" i="1" dirty="0">
-                <a:solidFill>
-                  <a:schemeClr val="accent1">
-                    <a:lumMod val="75000"/>
-                  </a:schemeClr>
-                </a:solidFill>
-              </a:rPr>
-              <a:t>Python.</a:t>
-            </a:r>
-          </a:p>
-        </p:txBody>
-      </p:sp>
-    </p:spTree>
-    <p:extLst>
-      <p:ext uri="{BB962C8B-B14F-4D97-AF65-F5344CB8AC3E}">
-        <p14:creationId xmlns:p14="http://schemas.microsoft.com/office/powerpoint/2010/main" val="1812056725"/>
-      </p:ext>
-    </p:extLst>
-  </p:cSld>
-  <p:clrMapOvr>
-    <a:masterClrMapping/>
-  </p:clrMapOvr>
-</p:sld>
-</file>
-
-<file path=ppt/slides/slide30.xml><?xml version="1.0" encoding="utf-8"?>
+<file path=ppt/slides/slide31.xml><?xml version="1.0" encoding="utf-8"?>
 <p:sld xmlns:a="http://schemas.openxmlformats.org/drawingml/2006/main" xmlns:r="http://schemas.openxmlformats.org/officeDocument/2006/relationships" xmlns:p="http://schemas.openxmlformats.org/presentationml/2006/main">
   <p:cSld>
     <p:spTree>

</xml_diff>